<commit_message>
commited at 2020-04-16 09:27:58.622295
</commit_message>
<xml_diff>
--- a/Presentations/COVID-19 15-04-2020.pptx
+++ b/Presentations/COVID-19 15-04-2020.pptx
@@ -37,6 +37,9 @@
     <p:sldId id="285" r:id="rId36"/>
     <p:sldId id="286" r:id="rId37"/>
     <p:sldId id="287" r:id="rId38"/>
+    <p:sldId id="288" r:id="rId39"/>
+    <p:sldId id="289" r:id="rId40"/>
+    <p:sldId id="290" r:id="rId41"/>
   </p:sldIdLst>
   <p:sldSz cx="9144000" cy="6858000" type="screen4x3"/>
   <p:notesSz cx="6858000" cy="9144000"/>
@@ -3179,6 +3182,40 @@
         <p:nvPr/>
       </p:nvGrpSpPr>
       <p:grpSpPr/>
+      <p:sp>
+        <p:nvSpPr>
+          <p:cNvPr id="2" name="Title 1"/>
+          <p:cNvSpPr>
+            <a:spLocks noGrp="1"/>
+          </p:cNvSpPr>
+          <p:nvPr>
+            <p:ph type="title"/>
+          </p:nvPr>
+        </p:nvSpPr>
+        <p:spPr/>
+        <p:txBody>
+          <a:bodyPr/>
+          <a:lstStyle/>
+          <a:p/>
+        </p:txBody>
+      </p:sp>
+      <p:sp>
+        <p:nvSpPr>
+          <p:cNvPr id="4" name="Text Placeholder 3"/>
+          <p:cNvSpPr>
+            <a:spLocks noGrp="1"/>
+          </p:cNvSpPr>
+          <p:nvPr>
+            <p:ph type="body" idx="2" sz="half"/>
+          </p:nvPr>
+        </p:nvSpPr>
+        <p:spPr/>
+        <p:txBody>
+          <a:bodyPr/>
+          <a:lstStyle/>
+          <a:p/>
+        </p:txBody>
+      </p:sp>
       <p:pic>
         <p:nvPicPr>
           <p:cNvPr id="5" name="Picture 4" descr="image.png"/>
@@ -3195,7 +3232,7 @@
         </p:blipFill>
         <p:spPr>
           <a:xfrm>
-            <a:off x="457200" y="274320"/>
+            <a:off x="457200" y="1600200"/>
             <a:ext cx="8229600" cy="3657600"/>
           </a:xfrm>
           <a:prstGeom prst="rect">
@@ -3203,44 +3240,6 @@
           </a:prstGeom>
         </p:spPr>
       </p:pic>
-      <p:sp>
-        <p:nvSpPr>
-          <p:cNvPr id="2" name="Title 1"/>
-          <p:cNvSpPr>
-            <a:spLocks noGrp="1"/>
-          </p:cNvSpPr>
-          <p:nvPr>
-            <p:ph type="title"/>
-          </p:nvPr>
-        </p:nvSpPr>
-        <p:spPr/>
-        <p:txBody>
-          <a:bodyPr/>
-          <a:lstStyle/>
-          <a:p>
-            <a:r>
-              <a:t>Countries by COVID-19 Mortality Rates</a:t>
-            </a:r>
-          </a:p>
-        </p:txBody>
-      </p:sp>
-      <p:sp>
-        <p:nvSpPr>
-          <p:cNvPr id="4" name="Text Placeholder 3"/>
-          <p:cNvSpPr>
-            <a:spLocks noGrp="1"/>
-          </p:cNvSpPr>
-          <p:nvPr>
-            <p:ph type="body" idx="2" sz="half"/>
-          </p:nvPr>
-        </p:nvSpPr>
-        <p:spPr/>
-        <p:txBody>
-          <a:bodyPr/>
-          <a:lstStyle/>
-          <a:p/>
-        </p:txBody>
-      </p:sp>
     </p:spTree>
   </p:cSld>
   <p:clrMapOvr>
@@ -3259,6 +3258,40 @@
         <p:nvPr/>
       </p:nvGrpSpPr>
       <p:grpSpPr/>
+      <p:sp>
+        <p:nvSpPr>
+          <p:cNvPr id="2" name="Title 1"/>
+          <p:cNvSpPr>
+            <a:spLocks noGrp="1"/>
+          </p:cNvSpPr>
+          <p:nvPr>
+            <p:ph type="title"/>
+          </p:nvPr>
+        </p:nvSpPr>
+        <p:spPr/>
+        <p:txBody>
+          <a:bodyPr/>
+          <a:lstStyle/>
+          <a:p/>
+        </p:txBody>
+      </p:sp>
+      <p:sp>
+        <p:nvSpPr>
+          <p:cNvPr id="4" name="Text Placeholder 3"/>
+          <p:cNvSpPr>
+            <a:spLocks noGrp="1"/>
+          </p:cNvSpPr>
+          <p:nvPr>
+            <p:ph type="body" idx="2" sz="half"/>
+          </p:nvPr>
+        </p:nvSpPr>
+        <p:spPr/>
+        <p:txBody>
+          <a:bodyPr/>
+          <a:lstStyle/>
+          <a:p/>
+        </p:txBody>
+      </p:sp>
       <p:pic>
         <p:nvPicPr>
           <p:cNvPr id="5" name="Picture 4" descr="image.png"/>
@@ -3275,52 +3308,14 @@
         </p:blipFill>
         <p:spPr>
           <a:xfrm>
-            <a:off x="457200" y="274320"/>
-            <a:ext cx="6858000" cy="4572000"/>
+            <a:off x="457200" y="685800"/>
+            <a:ext cx="8229600" cy="5486400"/>
           </a:xfrm>
           <a:prstGeom prst="rect">
             <a:avLst/>
           </a:prstGeom>
         </p:spPr>
       </p:pic>
-      <p:sp>
-        <p:nvSpPr>
-          <p:cNvPr id="2" name="Title 1"/>
-          <p:cNvSpPr>
-            <a:spLocks noGrp="1"/>
-          </p:cNvSpPr>
-          <p:nvPr>
-            <p:ph type="title"/>
-          </p:nvPr>
-        </p:nvSpPr>
-        <p:spPr/>
-        <p:txBody>
-          <a:bodyPr/>
-          <a:lstStyle/>
-          <a:p>
-            <a:r>
-              <a:t>Ratio Between Today and 10 Days Ago</a:t>
-            </a:r>
-          </a:p>
-        </p:txBody>
-      </p:sp>
-      <p:sp>
-        <p:nvSpPr>
-          <p:cNvPr id="4" name="Text Placeholder 3"/>
-          <p:cNvSpPr>
-            <a:spLocks noGrp="1"/>
-          </p:cNvSpPr>
-          <p:nvPr>
-            <p:ph type="body" idx="2" sz="half"/>
-          </p:nvPr>
-        </p:nvSpPr>
-        <p:spPr/>
-        <p:txBody>
-          <a:bodyPr/>
-          <a:lstStyle/>
-          <a:p/>
-        </p:txBody>
-      </p:sp>
     </p:spTree>
   </p:cSld>
   <p:clrMapOvr>
@@ -3339,6 +3334,40 @@
         <p:nvPr/>
       </p:nvGrpSpPr>
       <p:grpSpPr/>
+      <p:sp>
+        <p:nvSpPr>
+          <p:cNvPr id="2" name="Title 1"/>
+          <p:cNvSpPr>
+            <a:spLocks noGrp="1"/>
+          </p:cNvSpPr>
+          <p:nvPr>
+            <p:ph type="title"/>
+          </p:nvPr>
+        </p:nvSpPr>
+        <p:spPr/>
+        <p:txBody>
+          <a:bodyPr/>
+          <a:lstStyle/>
+          <a:p/>
+        </p:txBody>
+      </p:sp>
+      <p:sp>
+        <p:nvSpPr>
+          <p:cNvPr id="4" name="Text Placeholder 3"/>
+          <p:cNvSpPr>
+            <a:spLocks noGrp="1"/>
+          </p:cNvSpPr>
+          <p:nvPr>
+            <p:ph type="body" idx="2" sz="half"/>
+          </p:nvPr>
+        </p:nvSpPr>
+        <p:spPr/>
+        <p:txBody>
+          <a:bodyPr/>
+          <a:lstStyle/>
+          <a:p/>
+        </p:txBody>
+      </p:sp>
       <p:pic>
         <p:nvPicPr>
           <p:cNvPr id="5" name="Picture 4" descr="image.png"/>
@@ -3355,52 +3384,14 @@
         </p:blipFill>
         <p:spPr>
           <a:xfrm>
-            <a:off x="457200" y="274320"/>
-            <a:ext cx="6858000" cy="4572000"/>
+            <a:off x="457200" y="685800"/>
+            <a:ext cx="8229600" cy="5486400"/>
           </a:xfrm>
           <a:prstGeom prst="rect">
             <a:avLst/>
           </a:prstGeom>
         </p:spPr>
       </p:pic>
-      <p:sp>
-        <p:nvSpPr>
-          <p:cNvPr id="2" name="Title 1"/>
-          <p:cNvSpPr>
-            <a:spLocks noGrp="1"/>
-          </p:cNvSpPr>
-          <p:nvPr>
-            <p:ph type="title"/>
-          </p:nvPr>
-        </p:nvSpPr>
-        <p:spPr/>
-        <p:txBody>
-          <a:bodyPr/>
-          <a:lstStyle/>
-          <a:p>
-            <a:r>
-              <a:t>Confirmed Cases by Country</a:t>
-            </a:r>
-          </a:p>
-        </p:txBody>
-      </p:sp>
-      <p:sp>
-        <p:nvSpPr>
-          <p:cNvPr id="4" name="Text Placeholder 3"/>
-          <p:cNvSpPr>
-            <a:spLocks noGrp="1"/>
-          </p:cNvSpPr>
-          <p:nvPr>
-            <p:ph type="body" idx="2" sz="half"/>
-          </p:nvPr>
-        </p:nvSpPr>
-        <p:spPr/>
-        <p:txBody>
-          <a:bodyPr/>
-          <a:lstStyle/>
-          <a:p/>
-        </p:txBody>
-      </p:sp>
     </p:spTree>
   </p:cSld>
   <p:clrMapOvr>
@@ -3419,6 +3410,40 @@
         <p:nvPr/>
       </p:nvGrpSpPr>
       <p:grpSpPr/>
+      <p:sp>
+        <p:nvSpPr>
+          <p:cNvPr id="2" name="Title 1"/>
+          <p:cNvSpPr>
+            <a:spLocks noGrp="1"/>
+          </p:cNvSpPr>
+          <p:nvPr>
+            <p:ph type="title"/>
+          </p:nvPr>
+        </p:nvSpPr>
+        <p:spPr/>
+        <p:txBody>
+          <a:bodyPr/>
+          <a:lstStyle/>
+          <a:p/>
+        </p:txBody>
+      </p:sp>
+      <p:sp>
+        <p:nvSpPr>
+          <p:cNvPr id="4" name="Text Placeholder 3"/>
+          <p:cNvSpPr>
+            <a:spLocks noGrp="1"/>
+          </p:cNvSpPr>
+          <p:nvPr>
+            <p:ph type="body" idx="2" sz="half"/>
+          </p:nvPr>
+        </p:nvSpPr>
+        <p:spPr/>
+        <p:txBody>
+          <a:bodyPr/>
+          <a:lstStyle/>
+          <a:p/>
+        </p:txBody>
+      </p:sp>
       <p:pic>
         <p:nvPicPr>
           <p:cNvPr id="5" name="Picture 4" descr="image.png"/>
@@ -3435,52 +3460,14 @@
         </p:blipFill>
         <p:spPr>
           <a:xfrm>
-            <a:off x="457200" y="274320"/>
-            <a:ext cx="6858000" cy="4572000"/>
+            <a:off x="457200" y="685800"/>
+            <a:ext cx="8229600" cy="5486400"/>
           </a:xfrm>
           <a:prstGeom prst="rect">
             <a:avLst/>
           </a:prstGeom>
         </p:spPr>
       </p:pic>
-      <p:sp>
-        <p:nvSpPr>
-          <p:cNvPr id="2" name="Title 1"/>
-          <p:cNvSpPr>
-            <a:spLocks noGrp="1"/>
-          </p:cNvSpPr>
-          <p:nvPr>
-            <p:ph type="title"/>
-          </p:nvPr>
-        </p:nvSpPr>
-        <p:spPr/>
-        <p:txBody>
-          <a:bodyPr/>
-          <a:lstStyle/>
-          <a:p>
-            <a:r>
-              <a:t>Confirmed Cases in Israel</a:t>
-            </a:r>
-          </a:p>
-        </p:txBody>
-      </p:sp>
-      <p:sp>
-        <p:nvSpPr>
-          <p:cNvPr id="4" name="Text Placeholder 3"/>
-          <p:cNvSpPr>
-            <a:spLocks noGrp="1"/>
-          </p:cNvSpPr>
-          <p:nvPr>
-            <p:ph type="body" idx="2" sz="half"/>
-          </p:nvPr>
-        </p:nvSpPr>
-        <p:spPr/>
-        <p:txBody>
-          <a:bodyPr/>
-          <a:lstStyle/>
-          <a:p/>
-        </p:txBody>
-      </p:sp>
     </p:spTree>
   </p:cSld>
   <p:clrMapOvr>
@@ -3499,6 +3486,40 @@
         <p:nvPr/>
       </p:nvGrpSpPr>
       <p:grpSpPr/>
+      <p:sp>
+        <p:nvSpPr>
+          <p:cNvPr id="2" name="Title 1"/>
+          <p:cNvSpPr>
+            <a:spLocks noGrp="1"/>
+          </p:cNvSpPr>
+          <p:nvPr>
+            <p:ph type="title"/>
+          </p:nvPr>
+        </p:nvSpPr>
+        <p:spPr/>
+        <p:txBody>
+          <a:bodyPr/>
+          <a:lstStyle/>
+          <a:p/>
+        </p:txBody>
+      </p:sp>
+      <p:sp>
+        <p:nvSpPr>
+          <p:cNvPr id="4" name="Text Placeholder 3"/>
+          <p:cNvSpPr>
+            <a:spLocks noGrp="1"/>
+          </p:cNvSpPr>
+          <p:nvPr>
+            <p:ph type="body" idx="2" sz="half"/>
+          </p:nvPr>
+        </p:nvSpPr>
+        <p:spPr/>
+        <p:txBody>
+          <a:bodyPr/>
+          <a:lstStyle/>
+          <a:p/>
+        </p:txBody>
+      </p:sp>
       <p:pic>
         <p:nvPicPr>
           <p:cNvPr id="5" name="Picture 4" descr="image.png"/>
@@ -3515,56 +3536,14 @@
         </p:blipFill>
         <p:spPr>
           <a:xfrm>
-            <a:off x="457200" y="274320"/>
-            <a:ext cx="6858000" cy="4572000"/>
+            <a:off x="457200" y="685800"/>
+            <a:ext cx="8229600" cy="5486400"/>
           </a:xfrm>
           <a:prstGeom prst="rect">
             <a:avLst/>
           </a:prstGeom>
         </p:spPr>
       </p:pic>
-      <p:sp>
-        <p:nvSpPr>
-          <p:cNvPr id="2" name="Title 1"/>
-          <p:cNvSpPr>
-            <a:spLocks noGrp="1"/>
-          </p:cNvSpPr>
-          <p:nvPr>
-            <p:ph type="title"/>
-          </p:nvPr>
-        </p:nvSpPr>
-        <p:spPr/>
-        <p:txBody>
-          <a:bodyPr/>
-          <a:lstStyle/>
-          <a:p>
-            <a:r>
-              <a:t>Confirmed Cases in Israel</a:t>
-            </a:r>
-          </a:p>
-        </p:txBody>
-      </p:sp>
-      <p:sp>
-        <p:nvSpPr>
-          <p:cNvPr id="4" name="Text Placeholder 3"/>
-          <p:cNvSpPr>
-            <a:spLocks noGrp="1"/>
-          </p:cNvSpPr>
-          <p:nvPr>
-            <p:ph type="body" idx="2" sz="half"/>
-          </p:nvPr>
-        </p:nvSpPr>
-        <p:spPr/>
-        <p:txBody>
-          <a:bodyPr/>
-          <a:lstStyle/>
-          <a:p>
-            <a:r>
-              <a:t>Since the 100th Case</a:t>
-            </a:r>
-          </a:p>
-        </p:txBody>
-      </p:sp>
     </p:spTree>
   </p:cSld>
   <p:clrMapOvr>
@@ -3583,6 +3562,40 @@
         <p:nvPr/>
       </p:nvGrpSpPr>
       <p:grpSpPr/>
+      <p:sp>
+        <p:nvSpPr>
+          <p:cNvPr id="2" name="Title 1"/>
+          <p:cNvSpPr>
+            <a:spLocks noGrp="1"/>
+          </p:cNvSpPr>
+          <p:nvPr>
+            <p:ph type="title"/>
+          </p:nvPr>
+        </p:nvSpPr>
+        <p:spPr/>
+        <p:txBody>
+          <a:bodyPr/>
+          <a:lstStyle/>
+          <a:p/>
+        </p:txBody>
+      </p:sp>
+      <p:sp>
+        <p:nvSpPr>
+          <p:cNvPr id="4" name="Text Placeholder 3"/>
+          <p:cNvSpPr>
+            <a:spLocks noGrp="1"/>
+          </p:cNvSpPr>
+          <p:nvPr>
+            <p:ph type="body" idx="2" sz="half"/>
+          </p:nvPr>
+        </p:nvSpPr>
+        <p:spPr/>
+        <p:txBody>
+          <a:bodyPr/>
+          <a:lstStyle/>
+          <a:p/>
+        </p:txBody>
+      </p:sp>
       <p:pic>
         <p:nvPicPr>
           <p:cNvPr id="5" name="Picture 4" descr="image.png"/>
@@ -3599,56 +3612,14 @@
         </p:blipFill>
         <p:spPr>
           <a:xfrm>
-            <a:off x="457200" y="274320"/>
-            <a:ext cx="6858000" cy="4572000"/>
+            <a:off x="457200" y="685800"/>
+            <a:ext cx="8229600" cy="5486400"/>
           </a:xfrm>
           <a:prstGeom prst="rect">
             <a:avLst/>
           </a:prstGeom>
         </p:spPr>
       </p:pic>
-      <p:sp>
-        <p:nvSpPr>
-          <p:cNvPr id="2" name="Title 1"/>
-          <p:cNvSpPr>
-            <a:spLocks noGrp="1"/>
-          </p:cNvSpPr>
-          <p:nvPr>
-            <p:ph type="title"/>
-          </p:nvPr>
-        </p:nvSpPr>
-        <p:spPr/>
-        <p:txBody>
-          <a:bodyPr/>
-          <a:lstStyle/>
-          <a:p>
-            <a:r>
-              <a:t>Confirmed Cases</a:t>
-            </a:r>
-          </a:p>
-        </p:txBody>
-      </p:sp>
-      <p:sp>
-        <p:nvSpPr>
-          <p:cNvPr id="4" name="Text Placeholder 3"/>
-          <p:cNvSpPr>
-            <a:spLocks noGrp="1"/>
-          </p:cNvSpPr>
-          <p:nvPr>
-            <p:ph type="body" idx="2" sz="half"/>
-          </p:nvPr>
-        </p:nvSpPr>
-        <p:spPr/>
-        <p:txBody>
-          <a:bodyPr/>
-          <a:lstStyle/>
-          <a:p>
-            <a:r>
-              <a:t>Since the 100th Case, First 34 Days</a:t>
-            </a:r>
-          </a:p>
-        </p:txBody>
-      </p:sp>
     </p:spTree>
   </p:cSld>
   <p:clrMapOvr>
@@ -3667,6 +3638,40 @@
         <p:nvPr/>
       </p:nvGrpSpPr>
       <p:grpSpPr/>
+      <p:sp>
+        <p:nvSpPr>
+          <p:cNvPr id="2" name="Title 1"/>
+          <p:cNvSpPr>
+            <a:spLocks noGrp="1"/>
+          </p:cNvSpPr>
+          <p:nvPr>
+            <p:ph type="title"/>
+          </p:nvPr>
+        </p:nvSpPr>
+        <p:spPr/>
+        <p:txBody>
+          <a:bodyPr/>
+          <a:lstStyle/>
+          <a:p/>
+        </p:txBody>
+      </p:sp>
+      <p:sp>
+        <p:nvSpPr>
+          <p:cNvPr id="4" name="Text Placeholder 3"/>
+          <p:cNvSpPr>
+            <a:spLocks noGrp="1"/>
+          </p:cNvSpPr>
+          <p:nvPr>
+            <p:ph type="body" idx="2" sz="half"/>
+          </p:nvPr>
+        </p:nvSpPr>
+        <p:spPr/>
+        <p:txBody>
+          <a:bodyPr/>
+          <a:lstStyle/>
+          <a:p/>
+        </p:txBody>
+      </p:sp>
       <p:pic>
         <p:nvPicPr>
           <p:cNvPr id="5" name="Picture 4" descr="image.png"/>
@@ -3683,56 +3688,14 @@
         </p:blipFill>
         <p:spPr>
           <a:xfrm>
-            <a:off x="457200" y="274320"/>
-            <a:ext cx="6858000" cy="4572000"/>
+            <a:off x="457200" y="685800"/>
+            <a:ext cx="8229600" cy="5486400"/>
           </a:xfrm>
           <a:prstGeom prst="rect">
             <a:avLst/>
           </a:prstGeom>
         </p:spPr>
       </p:pic>
-      <p:sp>
-        <p:nvSpPr>
-          <p:cNvPr id="2" name="Title 1"/>
-          <p:cNvSpPr>
-            <a:spLocks noGrp="1"/>
-          </p:cNvSpPr>
-          <p:nvPr>
-            <p:ph type="title"/>
-          </p:nvPr>
-        </p:nvSpPr>
-        <p:spPr/>
-        <p:txBody>
-          <a:bodyPr/>
-          <a:lstStyle/>
-          <a:p>
-            <a:r>
-              <a:t>Confirmed Cases</a:t>
-            </a:r>
-          </a:p>
-        </p:txBody>
-      </p:sp>
-      <p:sp>
-        <p:nvSpPr>
-          <p:cNvPr id="4" name="Text Placeholder 3"/>
-          <p:cNvSpPr>
-            <a:spLocks noGrp="1"/>
-          </p:cNvSpPr>
-          <p:nvPr>
-            <p:ph type="body" idx="2" sz="half"/>
-          </p:nvPr>
-        </p:nvSpPr>
-        <p:spPr/>
-        <p:txBody>
-          <a:bodyPr/>
-          <a:lstStyle/>
-          <a:p>
-            <a:r>
-              <a:t>Since the 100th Case</a:t>
-            </a:r>
-          </a:p>
-        </p:txBody>
-      </p:sp>
     </p:spTree>
   </p:cSld>
   <p:clrMapOvr>
@@ -3751,6 +3714,40 @@
         <p:nvPr/>
       </p:nvGrpSpPr>
       <p:grpSpPr/>
+      <p:sp>
+        <p:nvSpPr>
+          <p:cNvPr id="2" name="Title 1"/>
+          <p:cNvSpPr>
+            <a:spLocks noGrp="1"/>
+          </p:cNvSpPr>
+          <p:nvPr>
+            <p:ph type="title"/>
+          </p:nvPr>
+        </p:nvSpPr>
+        <p:spPr/>
+        <p:txBody>
+          <a:bodyPr/>
+          <a:lstStyle/>
+          <a:p/>
+        </p:txBody>
+      </p:sp>
+      <p:sp>
+        <p:nvSpPr>
+          <p:cNvPr id="4" name="Text Placeholder 3"/>
+          <p:cNvSpPr>
+            <a:spLocks noGrp="1"/>
+          </p:cNvSpPr>
+          <p:nvPr>
+            <p:ph type="body" idx="2" sz="half"/>
+          </p:nvPr>
+        </p:nvSpPr>
+        <p:spPr/>
+        <p:txBody>
+          <a:bodyPr/>
+          <a:lstStyle/>
+          <a:p/>
+        </p:txBody>
+      </p:sp>
       <p:pic>
         <p:nvPicPr>
           <p:cNvPr id="5" name="Picture 4" descr="image.png"/>
@@ -3767,52 +3764,14 @@
         </p:blipFill>
         <p:spPr>
           <a:xfrm>
-            <a:off x="457200" y="274320"/>
-            <a:ext cx="6858000" cy="4572000"/>
+            <a:off x="457200" y="685800"/>
+            <a:ext cx="8229600" cy="5486400"/>
           </a:xfrm>
           <a:prstGeom prst="rect">
             <a:avLst/>
           </a:prstGeom>
         </p:spPr>
       </p:pic>
-      <p:sp>
-        <p:nvSpPr>
-          <p:cNvPr id="2" name="Title 1"/>
-          <p:cNvSpPr>
-            <a:spLocks noGrp="1"/>
-          </p:cNvSpPr>
-          <p:nvPr>
-            <p:ph type="title"/>
-          </p:nvPr>
-        </p:nvSpPr>
-        <p:spPr/>
-        <p:txBody>
-          <a:bodyPr/>
-          <a:lstStyle/>
-          <a:p>
-            <a:r>
-              <a:t>Fatal Cases by Country</a:t>
-            </a:r>
-          </a:p>
-        </p:txBody>
-      </p:sp>
-      <p:sp>
-        <p:nvSpPr>
-          <p:cNvPr id="4" name="Text Placeholder 3"/>
-          <p:cNvSpPr>
-            <a:spLocks noGrp="1"/>
-          </p:cNvSpPr>
-          <p:nvPr>
-            <p:ph type="body" idx="2" sz="half"/>
-          </p:nvPr>
-        </p:nvSpPr>
-        <p:spPr/>
-        <p:txBody>
-          <a:bodyPr/>
-          <a:lstStyle/>
-          <a:p/>
-        </p:txBody>
-      </p:sp>
     </p:spTree>
   </p:cSld>
   <p:clrMapOvr>
@@ -3831,6 +3790,40 @@
         <p:nvPr/>
       </p:nvGrpSpPr>
       <p:grpSpPr/>
+      <p:sp>
+        <p:nvSpPr>
+          <p:cNvPr id="2" name="Title 1"/>
+          <p:cNvSpPr>
+            <a:spLocks noGrp="1"/>
+          </p:cNvSpPr>
+          <p:nvPr>
+            <p:ph type="title"/>
+          </p:nvPr>
+        </p:nvSpPr>
+        <p:spPr/>
+        <p:txBody>
+          <a:bodyPr/>
+          <a:lstStyle/>
+          <a:p/>
+        </p:txBody>
+      </p:sp>
+      <p:sp>
+        <p:nvSpPr>
+          <p:cNvPr id="4" name="Text Placeholder 3"/>
+          <p:cNvSpPr>
+            <a:spLocks noGrp="1"/>
+          </p:cNvSpPr>
+          <p:nvPr>
+            <p:ph type="body" idx="2" sz="half"/>
+          </p:nvPr>
+        </p:nvSpPr>
+        <p:spPr/>
+        <p:txBody>
+          <a:bodyPr/>
+          <a:lstStyle/>
+          <a:p/>
+        </p:txBody>
+      </p:sp>
       <p:pic>
         <p:nvPicPr>
           <p:cNvPr id="5" name="Picture 4" descr="image.png"/>
@@ -3847,52 +3840,14 @@
         </p:blipFill>
         <p:spPr>
           <a:xfrm>
-            <a:off x="457200" y="274320"/>
-            <a:ext cx="6858000" cy="4572000"/>
+            <a:off x="457200" y="685800"/>
+            <a:ext cx="8229600" cy="5486400"/>
           </a:xfrm>
           <a:prstGeom prst="rect">
             <a:avLst/>
           </a:prstGeom>
         </p:spPr>
       </p:pic>
-      <p:sp>
-        <p:nvSpPr>
-          <p:cNvPr id="2" name="Title 1"/>
-          <p:cNvSpPr>
-            <a:spLocks noGrp="1"/>
-          </p:cNvSpPr>
-          <p:nvPr>
-            <p:ph type="title"/>
-          </p:nvPr>
-        </p:nvSpPr>
-        <p:spPr/>
-        <p:txBody>
-          <a:bodyPr/>
-          <a:lstStyle/>
-          <a:p>
-            <a:r>
-              <a:t>Fatal Cases in Israel</a:t>
-            </a:r>
-          </a:p>
-        </p:txBody>
-      </p:sp>
-      <p:sp>
-        <p:nvSpPr>
-          <p:cNvPr id="4" name="Text Placeholder 3"/>
-          <p:cNvSpPr>
-            <a:spLocks noGrp="1"/>
-          </p:cNvSpPr>
-          <p:nvPr>
-            <p:ph type="body" idx="2" sz="half"/>
-          </p:nvPr>
-        </p:nvSpPr>
-        <p:spPr/>
-        <p:txBody>
-          <a:bodyPr/>
-          <a:lstStyle/>
-          <a:p/>
-        </p:txBody>
-      </p:sp>
     </p:spTree>
   </p:cSld>
   <p:clrMapOvr>
@@ -3911,6 +3866,40 @@
         <p:nvPr/>
       </p:nvGrpSpPr>
       <p:grpSpPr/>
+      <p:sp>
+        <p:nvSpPr>
+          <p:cNvPr id="2" name="Title 1"/>
+          <p:cNvSpPr>
+            <a:spLocks noGrp="1"/>
+          </p:cNvSpPr>
+          <p:nvPr>
+            <p:ph type="title"/>
+          </p:nvPr>
+        </p:nvSpPr>
+        <p:spPr/>
+        <p:txBody>
+          <a:bodyPr/>
+          <a:lstStyle/>
+          <a:p/>
+        </p:txBody>
+      </p:sp>
+      <p:sp>
+        <p:nvSpPr>
+          <p:cNvPr id="4" name="Text Placeholder 3"/>
+          <p:cNvSpPr>
+            <a:spLocks noGrp="1"/>
+          </p:cNvSpPr>
+          <p:nvPr>
+            <p:ph type="body" idx="2" sz="half"/>
+          </p:nvPr>
+        </p:nvSpPr>
+        <p:spPr/>
+        <p:txBody>
+          <a:bodyPr/>
+          <a:lstStyle/>
+          <a:p/>
+        </p:txBody>
+      </p:sp>
       <p:pic>
         <p:nvPicPr>
           <p:cNvPr id="5" name="Picture 4" descr="image.png"/>
@@ -3927,56 +3916,14 @@
         </p:blipFill>
         <p:spPr>
           <a:xfrm>
-            <a:off x="457200" y="274320"/>
-            <a:ext cx="6858000" cy="4572000"/>
+            <a:off x="457200" y="685800"/>
+            <a:ext cx="8229600" cy="5486400"/>
           </a:xfrm>
           <a:prstGeom prst="rect">
             <a:avLst/>
           </a:prstGeom>
         </p:spPr>
       </p:pic>
-      <p:sp>
-        <p:nvSpPr>
-          <p:cNvPr id="2" name="Title 1"/>
-          <p:cNvSpPr>
-            <a:spLocks noGrp="1"/>
-          </p:cNvSpPr>
-          <p:nvPr>
-            <p:ph type="title"/>
-          </p:nvPr>
-        </p:nvSpPr>
-        <p:spPr/>
-        <p:txBody>
-          <a:bodyPr/>
-          <a:lstStyle/>
-          <a:p>
-            <a:r>
-              <a:t>Fatal Cases in Israel</a:t>
-            </a:r>
-          </a:p>
-        </p:txBody>
-      </p:sp>
-      <p:sp>
-        <p:nvSpPr>
-          <p:cNvPr id="4" name="Text Placeholder 3"/>
-          <p:cNvSpPr>
-            <a:spLocks noGrp="1"/>
-          </p:cNvSpPr>
-          <p:nvPr>
-            <p:ph type="body" idx="2" sz="half"/>
-          </p:nvPr>
-        </p:nvSpPr>
-        <p:spPr/>
-        <p:txBody>
-          <a:bodyPr/>
-          <a:lstStyle/>
-          <a:p>
-            <a:r>
-              <a:t>Since the 100th Case</a:t>
-            </a:r>
-          </a:p>
-        </p:txBody>
-      </p:sp>
     </p:spTree>
   </p:cSld>
   <p:clrMapOvr>
@@ -4144,6 +4091,40 @@
         <p:nvPr/>
       </p:nvGrpSpPr>
       <p:grpSpPr/>
+      <p:sp>
+        <p:nvSpPr>
+          <p:cNvPr id="2" name="Title 1"/>
+          <p:cNvSpPr>
+            <a:spLocks noGrp="1"/>
+          </p:cNvSpPr>
+          <p:nvPr>
+            <p:ph type="title"/>
+          </p:nvPr>
+        </p:nvSpPr>
+        <p:spPr/>
+        <p:txBody>
+          <a:bodyPr/>
+          <a:lstStyle/>
+          <a:p/>
+        </p:txBody>
+      </p:sp>
+      <p:sp>
+        <p:nvSpPr>
+          <p:cNvPr id="4" name="Text Placeholder 3"/>
+          <p:cNvSpPr>
+            <a:spLocks noGrp="1"/>
+          </p:cNvSpPr>
+          <p:nvPr>
+            <p:ph type="body" idx="2" sz="half"/>
+          </p:nvPr>
+        </p:nvSpPr>
+        <p:spPr/>
+        <p:txBody>
+          <a:bodyPr/>
+          <a:lstStyle/>
+          <a:p/>
+        </p:txBody>
+      </p:sp>
       <p:pic>
         <p:nvPicPr>
           <p:cNvPr id="5" name="Picture 4" descr="image.png"/>
@@ -4160,56 +4141,14 @@
         </p:blipFill>
         <p:spPr>
           <a:xfrm>
-            <a:off x="457200" y="274320"/>
-            <a:ext cx="6858000" cy="4572000"/>
+            <a:off x="457200" y="685800"/>
+            <a:ext cx="8229600" cy="5486400"/>
           </a:xfrm>
           <a:prstGeom prst="rect">
             <a:avLst/>
           </a:prstGeom>
         </p:spPr>
       </p:pic>
-      <p:sp>
-        <p:nvSpPr>
-          <p:cNvPr id="2" name="Title 1"/>
-          <p:cNvSpPr>
-            <a:spLocks noGrp="1"/>
-          </p:cNvSpPr>
-          <p:nvPr>
-            <p:ph type="title"/>
-          </p:nvPr>
-        </p:nvSpPr>
-        <p:spPr/>
-        <p:txBody>
-          <a:bodyPr/>
-          <a:lstStyle/>
-          <a:p>
-            <a:r>
-              <a:t>Fatal Cases</a:t>
-            </a:r>
-          </a:p>
-        </p:txBody>
-      </p:sp>
-      <p:sp>
-        <p:nvSpPr>
-          <p:cNvPr id="4" name="Text Placeholder 3"/>
-          <p:cNvSpPr>
-            <a:spLocks noGrp="1"/>
-          </p:cNvSpPr>
-          <p:nvPr>
-            <p:ph type="body" idx="2" sz="half"/>
-          </p:nvPr>
-        </p:nvSpPr>
-        <p:spPr/>
-        <p:txBody>
-          <a:bodyPr/>
-          <a:lstStyle/>
-          <a:p>
-            <a:r>
-              <a:t>Since the 10th Case, First 19 Days</a:t>
-            </a:r>
-          </a:p>
-        </p:txBody>
-      </p:sp>
     </p:spTree>
   </p:cSld>
   <p:clrMapOvr>
@@ -4228,6 +4167,40 @@
         <p:nvPr/>
       </p:nvGrpSpPr>
       <p:grpSpPr/>
+      <p:sp>
+        <p:nvSpPr>
+          <p:cNvPr id="2" name="Title 1"/>
+          <p:cNvSpPr>
+            <a:spLocks noGrp="1"/>
+          </p:cNvSpPr>
+          <p:nvPr>
+            <p:ph type="title"/>
+          </p:nvPr>
+        </p:nvSpPr>
+        <p:spPr/>
+        <p:txBody>
+          <a:bodyPr/>
+          <a:lstStyle/>
+          <a:p/>
+        </p:txBody>
+      </p:sp>
+      <p:sp>
+        <p:nvSpPr>
+          <p:cNvPr id="4" name="Text Placeholder 3"/>
+          <p:cNvSpPr>
+            <a:spLocks noGrp="1"/>
+          </p:cNvSpPr>
+          <p:nvPr>
+            <p:ph type="body" idx="2" sz="half"/>
+          </p:nvPr>
+        </p:nvSpPr>
+        <p:spPr/>
+        <p:txBody>
+          <a:bodyPr/>
+          <a:lstStyle/>
+          <a:p/>
+        </p:txBody>
+      </p:sp>
       <p:pic>
         <p:nvPicPr>
           <p:cNvPr id="5" name="Picture 4" descr="image.png"/>
@@ -4244,56 +4217,14 @@
         </p:blipFill>
         <p:spPr>
           <a:xfrm>
-            <a:off x="457200" y="274320"/>
-            <a:ext cx="6858000" cy="4572000"/>
+            <a:off x="457200" y="685800"/>
+            <a:ext cx="8229600" cy="5486400"/>
           </a:xfrm>
           <a:prstGeom prst="rect">
             <a:avLst/>
           </a:prstGeom>
         </p:spPr>
       </p:pic>
-      <p:sp>
-        <p:nvSpPr>
-          <p:cNvPr id="2" name="Title 1"/>
-          <p:cNvSpPr>
-            <a:spLocks noGrp="1"/>
-          </p:cNvSpPr>
-          <p:nvPr>
-            <p:ph type="title"/>
-          </p:nvPr>
-        </p:nvSpPr>
-        <p:spPr/>
-        <p:txBody>
-          <a:bodyPr/>
-          <a:lstStyle/>
-          <a:p>
-            <a:r>
-              <a:t>Fatal Cases</a:t>
-            </a:r>
-          </a:p>
-        </p:txBody>
-      </p:sp>
-      <p:sp>
-        <p:nvSpPr>
-          <p:cNvPr id="4" name="Text Placeholder 3"/>
-          <p:cNvSpPr>
-            <a:spLocks noGrp="1"/>
-          </p:cNvSpPr>
-          <p:nvPr>
-            <p:ph type="body" idx="2" sz="half"/>
-          </p:nvPr>
-        </p:nvSpPr>
-        <p:spPr/>
-        <p:txBody>
-          <a:bodyPr/>
-          <a:lstStyle/>
-          <a:p>
-            <a:r>
-              <a:t>Since the 10th Case</a:t>
-            </a:r>
-          </a:p>
-        </p:txBody>
-      </p:sp>
     </p:spTree>
   </p:cSld>
   <p:clrMapOvr>
@@ -4312,6 +4243,40 @@
         <p:nvPr/>
       </p:nvGrpSpPr>
       <p:grpSpPr/>
+      <p:sp>
+        <p:nvSpPr>
+          <p:cNvPr id="2" name="Title 1"/>
+          <p:cNvSpPr>
+            <a:spLocks noGrp="1"/>
+          </p:cNvSpPr>
+          <p:nvPr>
+            <p:ph type="title"/>
+          </p:nvPr>
+        </p:nvSpPr>
+        <p:spPr/>
+        <p:txBody>
+          <a:bodyPr/>
+          <a:lstStyle/>
+          <a:p/>
+        </p:txBody>
+      </p:sp>
+      <p:sp>
+        <p:nvSpPr>
+          <p:cNvPr id="4" name="Text Placeholder 3"/>
+          <p:cNvSpPr>
+            <a:spLocks noGrp="1"/>
+          </p:cNvSpPr>
+          <p:nvPr>
+            <p:ph type="body" idx="2" sz="half"/>
+          </p:nvPr>
+        </p:nvSpPr>
+        <p:spPr/>
+        <p:txBody>
+          <a:bodyPr/>
+          <a:lstStyle/>
+          <a:p/>
+        </p:txBody>
+      </p:sp>
       <p:pic>
         <p:nvPicPr>
           <p:cNvPr id="5" name="Picture 4" descr="image.png"/>
@@ -4328,56 +4293,14 @@
         </p:blipFill>
         <p:spPr>
           <a:xfrm>
-            <a:off x="457200" y="274320"/>
-            <a:ext cx="6858000" cy="4572000"/>
+            <a:off x="457200" y="685800"/>
+            <a:ext cx="8229600" cy="5486400"/>
           </a:xfrm>
           <a:prstGeom prst="rect">
             <a:avLst/>
           </a:prstGeom>
         </p:spPr>
       </p:pic>
-      <p:sp>
-        <p:nvSpPr>
-          <p:cNvPr id="2" name="Title 1"/>
-          <p:cNvSpPr>
-            <a:spLocks noGrp="1"/>
-          </p:cNvSpPr>
-          <p:nvPr>
-            <p:ph type="title"/>
-          </p:nvPr>
-        </p:nvSpPr>
-        <p:spPr/>
-        <p:txBody>
-          <a:bodyPr/>
-          <a:lstStyle/>
-          <a:p>
-            <a:r>
-              <a:t>Confirmed Cases by Country</a:t>
-            </a:r>
-          </a:p>
-        </p:txBody>
-      </p:sp>
-      <p:sp>
-        <p:nvSpPr>
-          <p:cNvPr id="4" name="Text Placeholder 3"/>
-          <p:cNvSpPr>
-            <a:spLocks noGrp="1"/>
-          </p:cNvSpPr>
-          <p:nvPr>
-            <p:ph type="body" idx="2" sz="half"/>
-          </p:nvPr>
-        </p:nvSpPr>
-        <p:spPr/>
-        <p:txBody>
-          <a:bodyPr/>
-          <a:lstStyle/>
-          <a:p>
-            <a:r>
-              <a:t>per 1m People</a:t>
-            </a:r>
-          </a:p>
-        </p:txBody>
-      </p:sp>
     </p:spTree>
   </p:cSld>
   <p:clrMapOvr>
@@ -4396,6 +4319,40 @@
         <p:nvPr/>
       </p:nvGrpSpPr>
       <p:grpSpPr/>
+      <p:sp>
+        <p:nvSpPr>
+          <p:cNvPr id="2" name="Title 1"/>
+          <p:cNvSpPr>
+            <a:spLocks noGrp="1"/>
+          </p:cNvSpPr>
+          <p:nvPr>
+            <p:ph type="title"/>
+          </p:nvPr>
+        </p:nvSpPr>
+        <p:spPr/>
+        <p:txBody>
+          <a:bodyPr/>
+          <a:lstStyle/>
+          <a:p/>
+        </p:txBody>
+      </p:sp>
+      <p:sp>
+        <p:nvSpPr>
+          <p:cNvPr id="4" name="Text Placeholder 3"/>
+          <p:cNvSpPr>
+            <a:spLocks noGrp="1"/>
+          </p:cNvSpPr>
+          <p:nvPr>
+            <p:ph type="body" idx="2" sz="half"/>
+          </p:nvPr>
+        </p:nvSpPr>
+        <p:spPr/>
+        <p:txBody>
+          <a:bodyPr/>
+          <a:lstStyle/>
+          <a:p/>
+        </p:txBody>
+      </p:sp>
       <p:pic>
         <p:nvPicPr>
           <p:cNvPr id="5" name="Picture 4" descr="image.png"/>
@@ -4412,56 +4369,14 @@
         </p:blipFill>
         <p:spPr>
           <a:xfrm>
-            <a:off x="457200" y="274320"/>
-            <a:ext cx="6858000" cy="4572000"/>
+            <a:off x="457200" y="685800"/>
+            <a:ext cx="8229600" cy="5486400"/>
           </a:xfrm>
           <a:prstGeom prst="rect">
             <a:avLst/>
           </a:prstGeom>
         </p:spPr>
       </p:pic>
-      <p:sp>
-        <p:nvSpPr>
-          <p:cNvPr id="2" name="Title 1"/>
-          <p:cNvSpPr>
-            <a:spLocks noGrp="1"/>
-          </p:cNvSpPr>
-          <p:nvPr>
-            <p:ph type="title"/>
-          </p:nvPr>
-        </p:nvSpPr>
-        <p:spPr/>
-        <p:txBody>
-          <a:bodyPr/>
-          <a:lstStyle/>
-          <a:p>
-            <a:r>
-              <a:t>Cases per 1m People</a:t>
-            </a:r>
-          </a:p>
-        </p:txBody>
-      </p:sp>
-      <p:sp>
-        <p:nvSpPr>
-          <p:cNvPr id="4" name="Text Placeholder 3"/>
-          <p:cNvSpPr>
-            <a:spLocks noGrp="1"/>
-          </p:cNvSpPr>
-          <p:nvPr>
-            <p:ph type="body" idx="2" sz="half"/>
-          </p:nvPr>
-        </p:nvSpPr>
-        <p:spPr/>
-        <p:txBody>
-          <a:bodyPr/>
-          <a:lstStyle/>
-          <a:p>
-            <a:r>
-              <a:t>Since Reaching 10 Cases per 1m</a:t>
-            </a:r>
-          </a:p>
-        </p:txBody>
-      </p:sp>
     </p:spTree>
   </p:cSld>
   <p:clrMapOvr>
@@ -4480,6 +4395,40 @@
         <p:nvPr/>
       </p:nvGrpSpPr>
       <p:grpSpPr/>
+      <p:sp>
+        <p:nvSpPr>
+          <p:cNvPr id="2" name="Title 1"/>
+          <p:cNvSpPr>
+            <a:spLocks noGrp="1"/>
+          </p:cNvSpPr>
+          <p:nvPr>
+            <p:ph type="title"/>
+          </p:nvPr>
+        </p:nvSpPr>
+        <p:spPr/>
+        <p:txBody>
+          <a:bodyPr/>
+          <a:lstStyle/>
+          <a:p/>
+        </p:txBody>
+      </p:sp>
+      <p:sp>
+        <p:nvSpPr>
+          <p:cNvPr id="4" name="Text Placeholder 3"/>
+          <p:cNvSpPr>
+            <a:spLocks noGrp="1"/>
+          </p:cNvSpPr>
+          <p:nvPr>
+            <p:ph type="body" idx="2" sz="half"/>
+          </p:nvPr>
+        </p:nvSpPr>
+        <p:spPr/>
+        <p:txBody>
+          <a:bodyPr/>
+          <a:lstStyle/>
+          <a:p/>
+        </p:txBody>
+      </p:sp>
       <p:pic>
         <p:nvPicPr>
           <p:cNvPr id="5" name="Picture 4" descr="image.png"/>
@@ -4496,56 +4445,14 @@
         </p:blipFill>
         <p:spPr>
           <a:xfrm>
-            <a:off x="457200" y="274320"/>
-            <a:ext cx="6858000" cy="4572000"/>
+            <a:off x="457200" y="685800"/>
+            <a:ext cx="8229600" cy="5486400"/>
           </a:xfrm>
           <a:prstGeom prst="rect">
             <a:avLst/>
           </a:prstGeom>
         </p:spPr>
       </p:pic>
-      <p:sp>
-        <p:nvSpPr>
-          <p:cNvPr id="2" name="Title 1"/>
-          <p:cNvSpPr>
-            <a:spLocks noGrp="1"/>
-          </p:cNvSpPr>
-          <p:nvPr>
-            <p:ph type="title"/>
-          </p:nvPr>
-        </p:nvSpPr>
-        <p:spPr/>
-        <p:txBody>
-          <a:bodyPr/>
-          <a:lstStyle/>
-          <a:p>
-            <a:r>
-              <a:t>Fatal Cases by Country</a:t>
-            </a:r>
-          </a:p>
-        </p:txBody>
-      </p:sp>
-      <p:sp>
-        <p:nvSpPr>
-          <p:cNvPr id="4" name="Text Placeholder 3"/>
-          <p:cNvSpPr>
-            <a:spLocks noGrp="1"/>
-          </p:cNvSpPr>
-          <p:nvPr>
-            <p:ph type="body" idx="2" sz="half"/>
-          </p:nvPr>
-        </p:nvSpPr>
-        <p:spPr/>
-        <p:txBody>
-          <a:bodyPr/>
-          <a:lstStyle/>
-          <a:p>
-            <a:r>
-              <a:t>per 1m People</a:t>
-            </a:r>
-          </a:p>
-        </p:txBody>
-      </p:sp>
     </p:spTree>
   </p:cSld>
   <p:clrMapOvr>
@@ -4564,6 +4471,40 @@
         <p:nvPr/>
       </p:nvGrpSpPr>
       <p:grpSpPr/>
+      <p:sp>
+        <p:nvSpPr>
+          <p:cNvPr id="2" name="Title 1"/>
+          <p:cNvSpPr>
+            <a:spLocks noGrp="1"/>
+          </p:cNvSpPr>
+          <p:nvPr>
+            <p:ph type="title"/>
+          </p:nvPr>
+        </p:nvSpPr>
+        <p:spPr/>
+        <p:txBody>
+          <a:bodyPr/>
+          <a:lstStyle/>
+          <a:p/>
+        </p:txBody>
+      </p:sp>
+      <p:sp>
+        <p:nvSpPr>
+          <p:cNvPr id="4" name="Text Placeholder 3"/>
+          <p:cNvSpPr>
+            <a:spLocks noGrp="1"/>
+          </p:cNvSpPr>
+          <p:nvPr>
+            <p:ph type="body" idx="2" sz="half"/>
+          </p:nvPr>
+        </p:nvSpPr>
+        <p:spPr/>
+        <p:txBody>
+          <a:bodyPr/>
+          <a:lstStyle/>
+          <a:p/>
+        </p:txBody>
+      </p:sp>
       <p:pic>
         <p:nvPicPr>
           <p:cNvPr id="5" name="Picture 4" descr="image.png"/>
@@ -4580,56 +4521,14 @@
         </p:blipFill>
         <p:spPr>
           <a:xfrm>
-            <a:off x="457200" y="274320"/>
-            <a:ext cx="6858000" cy="4572000"/>
+            <a:off x="457200" y="685800"/>
+            <a:ext cx="8229600" cy="5486400"/>
           </a:xfrm>
           <a:prstGeom prst="rect">
             <a:avLst/>
           </a:prstGeom>
         </p:spPr>
       </p:pic>
-      <p:sp>
-        <p:nvSpPr>
-          <p:cNvPr id="2" name="Title 1"/>
-          <p:cNvSpPr>
-            <a:spLocks noGrp="1"/>
-          </p:cNvSpPr>
-          <p:nvPr>
-            <p:ph type="title"/>
-          </p:nvPr>
-        </p:nvSpPr>
-        <p:spPr/>
-        <p:txBody>
-          <a:bodyPr/>
-          <a:lstStyle/>
-          <a:p>
-            <a:r>
-              <a:t>Fatal Cases per 1m People</a:t>
-            </a:r>
-          </a:p>
-        </p:txBody>
-      </p:sp>
-      <p:sp>
-        <p:nvSpPr>
-          <p:cNvPr id="4" name="Text Placeholder 3"/>
-          <p:cNvSpPr>
-            <a:spLocks noGrp="1"/>
-          </p:cNvSpPr>
-          <p:nvPr>
-            <p:ph type="body" idx="2" sz="half"/>
-          </p:nvPr>
-        </p:nvSpPr>
-        <p:spPr/>
-        <p:txBody>
-          <a:bodyPr/>
-          <a:lstStyle/>
-          <a:p>
-            <a:r>
-              <a:t>Since Reaching 3 Cases per 1m</a:t>
-            </a:r>
-          </a:p>
-        </p:txBody>
-      </p:sp>
     </p:spTree>
   </p:cSld>
   <p:clrMapOvr>
@@ -4648,6 +4547,40 @@
         <p:nvPr/>
       </p:nvGrpSpPr>
       <p:grpSpPr/>
+      <p:sp>
+        <p:nvSpPr>
+          <p:cNvPr id="2" name="Title 1"/>
+          <p:cNvSpPr>
+            <a:spLocks noGrp="1"/>
+          </p:cNvSpPr>
+          <p:nvPr>
+            <p:ph type="title"/>
+          </p:nvPr>
+        </p:nvSpPr>
+        <p:spPr/>
+        <p:txBody>
+          <a:bodyPr/>
+          <a:lstStyle/>
+          <a:p/>
+        </p:txBody>
+      </p:sp>
+      <p:sp>
+        <p:nvSpPr>
+          <p:cNvPr id="4" name="Text Placeholder 3"/>
+          <p:cNvSpPr>
+            <a:spLocks noGrp="1"/>
+          </p:cNvSpPr>
+          <p:nvPr>
+            <p:ph type="body" idx="2" sz="half"/>
+          </p:nvPr>
+        </p:nvSpPr>
+        <p:spPr/>
+        <p:txBody>
+          <a:bodyPr/>
+          <a:lstStyle/>
+          <a:p/>
+        </p:txBody>
+      </p:sp>
       <p:pic>
         <p:nvPicPr>
           <p:cNvPr id="5" name="Picture 4" descr="image.png"/>
@@ -4664,52 +4597,14 @@
         </p:blipFill>
         <p:spPr>
           <a:xfrm>
-            <a:off x="457200" y="274320"/>
-            <a:ext cx="6858000" cy="4572000"/>
+            <a:off x="457200" y="685800"/>
+            <a:ext cx="8229600" cy="5486400"/>
           </a:xfrm>
           <a:prstGeom prst="rect">
             <a:avLst/>
           </a:prstGeom>
         </p:spPr>
       </p:pic>
-      <p:sp>
-        <p:nvSpPr>
-          <p:cNvPr id="2" name="Title 1"/>
-          <p:cNvSpPr>
-            <a:spLocks noGrp="1"/>
-          </p:cNvSpPr>
-          <p:nvPr>
-            <p:ph type="title"/>
-          </p:nvPr>
-        </p:nvSpPr>
-        <p:spPr/>
-        <p:txBody>
-          <a:bodyPr/>
-          <a:lstStyle/>
-          <a:p>
-            <a:r>
-              <a:t>Cases and Mortality per 1m People</a:t>
-            </a:r>
-          </a:p>
-        </p:txBody>
-      </p:sp>
-      <p:sp>
-        <p:nvSpPr>
-          <p:cNvPr id="4" name="Text Placeholder 3"/>
-          <p:cNvSpPr>
-            <a:spLocks noGrp="1"/>
-          </p:cNvSpPr>
-          <p:nvPr>
-            <p:ph type="body" idx="2" sz="half"/>
-          </p:nvPr>
-        </p:nvSpPr>
-        <p:spPr/>
-        <p:txBody>
-          <a:bodyPr/>
-          <a:lstStyle/>
-          <a:p/>
-        </p:txBody>
-      </p:sp>
     </p:spTree>
   </p:cSld>
   <p:clrMapOvr>
@@ -4728,6 +4623,40 @@
         <p:nvPr/>
       </p:nvGrpSpPr>
       <p:grpSpPr/>
+      <p:sp>
+        <p:nvSpPr>
+          <p:cNvPr id="2" name="Title 1"/>
+          <p:cNvSpPr>
+            <a:spLocks noGrp="1"/>
+          </p:cNvSpPr>
+          <p:nvPr>
+            <p:ph type="title"/>
+          </p:nvPr>
+        </p:nvSpPr>
+        <p:spPr/>
+        <p:txBody>
+          <a:bodyPr/>
+          <a:lstStyle/>
+          <a:p/>
+        </p:txBody>
+      </p:sp>
+      <p:sp>
+        <p:nvSpPr>
+          <p:cNvPr id="4" name="Text Placeholder 3"/>
+          <p:cNvSpPr>
+            <a:spLocks noGrp="1"/>
+          </p:cNvSpPr>
+          <p:nvPr>
+            <p:ph type="body" idx="2" sz="half"/>
+          </p:nvPr>
+        </p:nvSpPr>
+        <p:spPr/>
+        <p:txBody>
+          <a:bodyPr/>
+          <a:lstStyle/>
+          <a:p/>
+        </p:txBody>
+      </p:sp>
       <p:pic>
         <p:nvPicPr>
           <p:cNvPr id="5" name="Picture 4" descr="image.png"/>
@@ -4744,52 +4673,14 @@
         </p:blipFill>
         <p:spPr>
           <a:xfrm>
-            <a:off x="457200" y="274320"/>
-            <a:ext cx="6858000" cy="4572000"/>
+            <a:off x="457200" y="685800"/>
+            <a:ext cx="8229600" cy="5486400"/>
           </a:xfrm>
           <a:prstGeom prst="rect">
             <a:avLst/>
           </a:prstGeom>
         </p:spPr>
       </p:pic>
-      <p:sp>
-        <p:nvSpPr>
-          <p:cNvPr id="2" name="Title 1"/>
-          <p:cNvSpPr>
-            <a:spLocks noGrp="1"/>
-          </p:cNvSpPr>
-          <p:nvPr>
-            <p:ph type="title"/>
-          </p:nvPr>
-        </p:nvSpPr>
-        <p:spPr/>
-        <p:txBody>
-          <a:bodyPr/>
-          <a:lstStyle/>
-          <a:p>
-            <a:r>
-              <a:t>Incrasing number of cases vs mortality rate</a:t>
-            </a:r>
-          </a:p>
-        </p:txBody>
-      </p:sp>
-      <p:sp>
-        <p:nvSpPr>
-          <p:cNvPr id="4" name="Text Placeholder 3"/>
-          <p:cNvSpPr>
-            <a:spLocks noGrp="1"/>
-          </p:cNvSpPr>
-          <p:nvPr>
-            <p:ph type="body" idx="2" sz="half"/>
-          </p:nvPr>
-        </p:nvSpPr>
-        <p:spPr/>
-        <p:txBody>
-          <a:bodyPr/>
-          <a:lstStyle/>
-          <a:p/>
-        </p:txBody>
-      </p:sp>
     </p:spTree>
   </p:cSld>
   <p:clrMapOvr>
@@ -4808,6 +4699,40 @@
         <p:nvPr/>
       </p:nvGrpSpPr>
       <p:grpSpPr/>
+      <p:sp>
+        <p:nvSpPr>
+          <p:cNvPr id="2" name="Title 1"/>
+          <p:cNvSpPr>
+            <a:spLocks noGrp="1"/>
+          </p:cNvSpPr>
+          <p:nvPr>
+            <p:ph type="title"/>
+          </p:nvPr>
+        </p:nvSpPr>
+        <p:spPr/>
+        <p:txBody>
+          <a:bodyPr/>
+          <a:lstStyle/>
+          <a:p/>
+        </p:txBody>
+      </p:sp>
+      <p:sp>
+        <p:nvSpPr>
+          <p:cNvPr id="4" name="Text Placeholder 3"/>
+          <p:cNvSpPr>
+            <a:spLocks noGrp="1"/>
+          </p:cNvSpPr>
+          <p:nvPr>
+            <p:ph type="body" idx="2" sz="half"/>
+          </p:nvPr>
+        </p:nvSpPr>
+        <p:spPr/>
+        <p:txBody>
+          <a:bodyPr/>
+          <a:lstStyle/>
+          <a:p/>
+        </p:txBody>
+      </p:sp>
       <p:pic>
         <p:nvPicPr>
           <p:cNvPr id="5" name="Picture 4" descr="image.png"/>
@@ -4824,56 +4749,14 @@
         </p:blipFill>
         <p:spPr>
           <a:xfrm>
-            <a:off x="457200" y="274320"/>
-            <a:ext cx="6858000" cy="4572000"/>
+            <a:off x="457200" y="685800"/>
+            <a:ext cx="8229600" cy="5486400"/>
           </a:xfrm>
           <a:prstGeom prst="rect">
             <a:avLst/>
           </a:prstGeom>
         </p:spPr>
       </p:pic>
-      <p:sp>
-        <p:nvSpPr>
-          <p:cNvPr id="2" name="Title 1"/>
-          <p:cNvSpPr>
-            <a:spLocks noGrp="1"/>
-          </p:cNvSpPr>
-          <p:nvPr>
-            <p:ph type="title"/>
-          </p:nvPr>
-        </p:nvSpPr>
-        <p:spPr/>
-        <p:txBody>
-          <a:bodyPr/>
-          <a:lstStyle/>
-          <a:p>
-            <a:r>
-              <a:t>Percent Change in Cases</a:t>
-            </a:r>
-          </a:p>
-        </p:txBody>
-      </p:sp>
-      <p:sp>
-        <p:nvSpPr>
-          <p:cNvPr id="4" name="Text Placeholder 3"/>
-          <p:cNvSpPr>
-            <a:spLocks noGrp="1"/>
-          </p:cNvSpPr>
-          <p:nvPr>
-            <p:ph type="body" idx="2" sz="half"/>
-          </p:nvPr>
-        </p:nvSpPr>
-        <p:spPr/>
-        <p:txBody>
-          <a:bodyPr/>
-          <a:lstStyle/>
-          <a:p>
-            <a:r>
-              <a:t>Since the 100th case, 10-days moving average</a:t>
-            </a:r>
-          </a:p>
-        </p:txBody>
-      </p:sp>
     </p:spTree>
   </p:cSld>
   <p:clrMapOvr>
@@ -4892,6 +4775,40 @@
         <p:nvPr/>
       </p:nvGrpSpPr>
       <p:grpSpPr/>
+      <p:sp>
+        <p:nvSpPr>
+          <p:cNvPr id="2" name="Title 1"/>
+          <p:cNvSpPr>
+            <a:spLocks noGrp="1"/>
+          </p:cNvSpPr>
+          <p:nvPr>
+            <p:ph type="title"/>
+          </p:nvPr>
+        </p:nvSpPr>
+        <p:spPr/>
+        <p:txBody>
+          <a:bodyPr/>
+          <a:lstStyle/>
+          <a:p/>
+        </p:txBody>
+      </p:sp>
+      <p:sp>
+        <p:nvSpPr>
+          <p:cNvPr id="4" name="Text Placeholder 3"/>
+          <p:cNvSpPr>
+            <a:spLocks noGrp="1"/>
+          </p:cNvSpPr>
+          <p:nvPr>
+            <p:ph type="body" idx="2" sz="half"/>
+          </p:nvPr>
+        </p:nvSpPr>
+        <p:spPr/>
+        <p:txBody>
+          <a:bodyPr/>
+          <a:lstStyle/>
+          <a:p/>
+        </p:txBody>
+      </p:sp>
       <p:pic>
         <p:nvPicPr>
           <p:cNvPr id="5" name="Picture 4" descr="image.png"/>
@@ -4908,56 +4825,14 @@
         </p:blipFill>
         <p:spPr>
           <a:xfrm>
-            <a:off x="457200" y="274320"/>
-            <a:ext cx="6858000" cy="4572000"/>
+            <a:off x="457200" y="685800"/>
+            <a:ext cx="8229600" cy="5486400"/>
           </a:xfrm>
           <a:prstGeom prst="rect">
             <a:avLst/>
           </a:prstGeom>
         </p:spPr>
       </p:pic>
-      <p:sp>
-        <p:nvSpPr>
-          <p:cNvPr id="2" name="Title 1"/>
-          <p:cNvSpPr>
-            <a:spLocks noGrp="1"/>
-          </p:cNvSpPr>
-          <p:nvPr>
-            <p:ph type="title"/>
-          </p:nvPr>
-        </p:nvSpPr>
-        <p:spPr/>
-        <p:txBody>
-          <a:bodyPr/>
-          <a:lstStyle/>
-          <a:p>
-            <a:r>
-              <a:t>Percent Change in Fatal Cases</a:t>
-            </a:r>
-          </a:p>
-        </p:txBody>
-      </p:sp>
-      <p:sp>
-        <p:nvSpPr>
-          <p:cNvPr id="4" name="Text Placeholder 3"/>
-          <p:cNvSpPr>
-            <a:spLocks noGrp="1"/>
-          </p:cNvSpPr>
-          <p:nvPr>
-            <p:ph type="body" idx="2" sz="half"/>
-          </p:nvPr>
-        </p:nvSpPr>
-        <p:spPr/>
-        <p:txBody>
-          <a:bodyPr/>
-          <a:lstStyle/>
-          <a:p>
-            <a:r>
-              <a:t>After 10 Fatal Cases, 10-days Moving Average</a:t>
-            </a:r>
-          </a:p>
-        </p:txBody>
-      </p:sp>
     </p:spTree>
   </p:cSld>
   <p:clrMapOvr>
@@ -5101,6 +4976,40 @@
         <p:nvPr/>
       </p:nvGrpSpPr>
       <p:grpSpPr/>
+      <p:sp>
+        <p:nvSpPr>
+          <p:cNvPr id="2" name="Title 1"/>
+          <p:cNvSpPr>
+            <a:spLocks noGrp="1"/>
+          </p:cNvSpPr>
+          <p:nvPr>
+            <p:ph type="title"/>
+          </p:nvPr>
+        </p:nvSpPr>
+        <p:spPr/>
+        <p:txBody>
+          <a:bodyPr/>
+          <a:lstStyle/>
+          <a:p/>
+        </p:txBody>
+      </p:sp>
+      <p:sp>
+        <p:nvSpPr>
+          <p:cNvPr id="4" name="Text Placeholder 3"/>
+          <p:cNvSpPr>
+            <a:spLocks noGrp="1"/>
+          </p:cNvSpPr>
+          <p:nvPr>
+            <p:ph type="body" idx="2" sz="half"/>
+          </p:nvPr>
+        </p:nvSpPr>
+        <p:spPr/>
+        <p:txBody>
+          <a:bodyPr/>
+          <a:lstStyle/>
+          <a:p/>
+        </p:txBody>
+      </p:sp>
       <p:pic>
         <p:nvPicPr>
           <p:cNvPr id="5" name="Picture 4" descr="image.png"/>
@@ -5117,56 +5026,14 @@
         </p:blipFill>
         <p:spPr>
           <a:xfrm>
-            <a:off x="457200" y="274320"/>
-            <a:ext cx="6858000" cy="4572000"/>
+            <a:off x="457200" y="685800"/>
+            <a:ext cx="8229600" cy="5486400"/>
           </a:xfrm>
           <a:prstGeom prst="rect">
             <a:avLst/>
           </a:prstGeom>
         </p:spPr>
       </p:pic>
-      <p:sp>
-        <p:nvSpPr>
-          <p:cNvPr id="2" name="Title 1"/>
-          <p:cNvSpPr>
-            <a:spLocks noGrp="1"/>
-          </p:cNvSpPr>
-          <p:nvPr>
-            <p:ph type="title"/>
-          </p:nvPr>
-        </p:nvSpPr>
-        <p:spPr/>
-        <p:txBody>
-          <a:bodyPr/>
-          <a:lstStyle/>
-          <a:p>
-            <a:r>
-              <a:t>New Confirmed Cases per Day</a:t>
-            </a:r>
-          </a:p>
-        </p:txBody>
-      </p:sp>
-      <p:sp>
-        <p:nvSpPr>
-          <p:cNvPr id="4" name="Text Placeholder 3"/>
-          <p:cNvSpPr>
-            <a:spLocks noGrp="1"/>
-          </p:cNvSpPr>
-          <p:nvPr>
-            <p:ph type="body" idx="2" sz="half"/>
-          </p:nvPr>
-        </p:nvSpPr>
-        <p:spPr/>
-        <p:txBody>
-          <a:bodyPr/>
-          <a:lstStyle/>
-          <a:p>
-            <a:r>
-              <a:t>Since Reaching 30, 7-day Moving Average</a:t>
-            </a:r>
-          </a:p>
-        </p:txBody>
-      </p:sp>
     </p:spTree>
   </p:cSld>
   <p:clrMapOvr>
@@ -5185,6 +5052,40 @@
         <p:nvPr/>
       </p:nvGrpSpPr>
       <p:grpSpPr/>
+      <p:sp>
+        <p:nvSpPr>
+          <p:cNvPr id="2" name="Title 1"/>
+          <p:cNvSpPr>
+            <a:spLocks noGrp="1"/>
+          </p:cNvSpPr>
+          <p:nvPr>
+            <p:ph type="title"/>
+          </p:nvPr>
+        </p:nvSpPr>
+        <p:spPr/>
+        <p:txBody>
+          <a:bodyPr/>
+          <a:lstStyle/>
+          <a:p/>
+        </p:txBody>
+      </p:sp>
+      <p:sp>
+        <p:nvSpPr>
+          <p:cNvPr id="4" name="Text Placeholder 3"/>
+          <p:cNvSpPr>
+            <a:spLocks noGrp="1"/>
+          </p:cNvSpPr>
+          <p:nvPr>
+            <p:ph type="body" idx="2" sz="half"/>
+          </p:nvPr>
+        </p:nvSpPr>
+        <p:spPr/>
+        <p:txBody>
+          <a:bodyPr/>
+          <a:lstStyle/>
+          <a:p/>
+        </p:txBody>
+      </p:sp>
       <p:pic>
         <p:nvPicPr>
           <p:cNvPr id="5" name="Picture 4" descr="image.png"/>
@@ -5201,56 +5102,14 @@
         </p:blipFill>
         <p:spPr>
           <a:xfrm>
-            <a:off x="457200" y="274320"/>
-            <a:ext cx="6858000" cy="4572000"/>
+            <a:off x="457200" y="685800"/>
+            <a:ext cx="8229600" cy="5486400"/>
           </a:xfrm>
           <a:prstGeom prst="rect">
             <a:avLst/>
           </a:prstGeom>
         </p:spPr>
       </p:pic>
-      <p:sp>
-        <p:nvSpPr>
-          <p:cNvPr id="2" name="Title 1"/>
-          <p:cNvSpPr>
-            <a:spLocks noGrp="1"/>
-          </p:cNvSpPr>
-          <p:nvPr>
-            <p:ph type="title"/>
-          </p:nvPr>
-        </p:nvSpPr>
-        <p:spPr/>
-        <p:txBody>
-          <a:bodyPr/>
-          <a:lstStyle/>
-          <a:p>
-            <a:r>
-              <a:t>New Fatal Cases per Day</a:t>
-            </a:r>
-          </a:p>
-        </p:txBody>
-      </p:sp>
-      <p:sp>
-        <p:nvSpPr>
-          <p:cNvPr id="4" name="Text Placeholder 3"/>
-          <p:cNvSpPr>
-            <a:spLocks noGrp="1"/>
-          </p:cNvSpPr>
-          <p:nvPr>
-            <p:ph type="body" idx="2" sz="half"/>
-          </p:nvPr>
-        </p:nvSpPr>
-        <p:spPr/>
-        <p:txBody>
-          <a:bodyPr/>
-          <a:lstStyle/>
-          <a:p>
-            <a:r>
-              <a:t>Since Reaching 3, 7-day Moving Average</a:t>
-            </a:r>
-          </a:p>
-        </p:txBody>
-      </p:sp>
     </p:spTree>
   </p:cSld>
   <p:clrMapOvr>
@@ -5269,6 +5128,40 @@
         <p:nvPr/>
       </p:nvGrpSpPr>
       <p:grpSpPr/>
+      <p:sp>
+        <p:nvSpPr>
+          <p:cNvPr id="2" name="Title 1"/>
+          <p:cNvSpPr>
+            <a:spLocks noGrp="1"/>
+          </p:cNvSpPr>
+          <p:nvPr>
+            <p:ph type="title"/>
+          </p:nvPr>
+        </p:nvSpPr>
+        <p:spPr/>
+        <p:txBody>
+          <a:bodyPr/>
+          <a:lstStyle/>
+          <a:p/>
+        </p:txBody>
+      </p:sp>
+      <p:sp>
+        <p:nvSpPr>
+          <p:cNvPr id="4" name="Text Placeholder 3"/>
+          <p:cNvSpPr>
+            <a:spLocks noGrp="1"/>
+          </p:cNvSpPr>
+          <p:nvPr>
+            <p:ph type="body" idx="2" sz="half"/>
+          </p:nvPr>
+        </p:nvSpPr>
+        <p:spPr/>
+        <p:txBody>
+          <a:bodyPr/>
+          <a:lstStyle/>
+          <a:p/>
+        </p:txBody>
+      </p:sp>
       <p:pic>
         <p:nvPicPr>
           <p:cNvPr id="5" name="Picture 4" descr="image.png"/>
@@ -5285,14 +5178,32 @@
         </p:blipFill>
         <p:spPr>
           <a:xfrm>
-            <a:off x="457200" y="274320"/>
-            <a:ext cx="7429500" cy="4572000"/>
+            <a:off x="457200" y="685800"/>
+            <a:ext cx="8229600" cy="5486400"/>
           </a:xfrm>
           <a:prstGeom prst="rect">
             <a:avLst/>
           </a:prstGeom>
         </p:spPr>
       </p:pic>
+    </p:spTree>
+  </p:cSld>
+  <p:clrMapOvr>
+    <a:masterClrMapping/>
+  </p:clrMapOvr>
+</p:sld>
+</file>
+
+<file path=ppt/slides/slide33.xml><?xml version="1.0" encoding="utf-8"?>
+<p:sld xmlns:a="http://schemas.openxmlformats.org/drawingml/2006/main" xmlns:p="http://schemas.openxmlformats.org/presentationml/2006/main" xmlns:r="http://schemas.openxmlformats.org/officeDocument/2006/relationships">
+  <p:cSld>
+    <p:spTree>
+      <p:nvGrpSpPr>
+        <p:cNvPr id="1" name=""/>
+        <p:cNvGrpSpPr/>
+        <p:nvPr/>
+      </p:nvGrpSpPr>
+      <p:grpSpPr/>
       <p:sp>
         <p:nvSpPr>
           <p:cNvPr id="2" name="Title 1"/>
@@ -5307,11 +5218,7 @@
         <p:txBody>
           <a:bodyPr/>
           <a:lstStyle/>
-          <a:p>
-            <a:r>
-              <a:t>Pandemic Progression</a:t>
-            </a:r>
-          </a:p>
+          <a:p/>
         </p:txBody>
       </p:sp>
       <p:sp>
@@ -5331,6 +5238,182 @@
           <a:p/>
         </p:txBody>
       </p:sp>
+      <p:pic>
+        <p:nvPicPr>
+          <p:cNvPr id="5" name="Picture 4" descr="image.png"/>
+          <p:cNvPicPr>
+            <a:picLocks noChangeAspect="1"/>
+          </p:cNvPicPr>
+          <p:nvPr/>
+        </p:nvPicPr>
+        <p:blipFill>
+          <a:blip r:embed="rId2"/>
+          <a:stretch>
+            <a:fillRect/>
+          </a:stretch>
+        </p:blipFill>
+        <p:spPr>
+          <a:xfrm>
+            <a:off x="457200" y="685800"/>
+            <a:ext cx="8229600" cy="5486400"/>
+          </a:xfrm>
+          <a:prstGeom prst="rect">
+            <a:avLst/>
+          </a:prstGeom>
+        </p:spPr>
+      </p:pic>
+    </p:spTree>
+  </p:cSld>
+  <p:clrMapOvr>
+    <a:masterClrMapping/>
+  </p:clrMapOvr>
+</p:sld>
+</file>
+
+<file path=ppt/slides/slide34.xml><?xml version="1.0" encoding="utf-8"?>
+<p:sld xmlns:a="http://schemas.openxmlformats.org/drawingml/2006/main" xmlns:p="http://schemas.openxmlformats.org/presentationml/2006/main" xmlns:r="http://schemas.openxmlformats.org/officeDocument/2006/relationships">
+  <p:cSld>
+    <p:spTree>
+      <p:nvGrpSpPr>
+        <p:cNvPr id="1" name=""/>
+        <p:cNvGrpSpPr/>
+        <p:nvPr/>
+      </p:nvGrpSpPr>
+      <p:grpSpPr/>
+      <p:sp>
+        <p:nvSpPr>
+          <p:cNvPr id="2" name="Title 1"/>
+          <p:cNvSpPr>
+            <a:spLocks noGrp="1"/>
+          </p:cNvSpPr>
+          <p:nvPr>
+            <p:ph type="title"/>
+          </p:nvPr>
+        </p:nvSpPr>
+        <p:spPr/>
+        <p:txBody>
+          <a:bodyPr/>
+          <a:lstStyle/>
+          <a:p/>
+        </p:txBody>
+      </p:sp>
+      <p:sp>
+        <p:nvSpPr>
+          <p:cNvPr id="4" name="Text Placeholder 3"/>
+          <p:cNvSpPr>
+            <a:spLocks noGrp="1"/>
+          </p:cNvSpPr>
+          <p:nvPr>
+            <p:ph type="body" idx="2" sz="half"/>
+          </p:nvPr>
+        </p:nvSpPr>
+        <p:spPr/>
+        <p:txBody>
+          <a:bodyPr/>
+          <a:lstStyle/>
+          <a:p/>
+        </p:txBody>
+      </p:sp>
+      <p:pic>
+        <p:nvPicPr>
+          <p:cNvPr id="5" name="Picture 4" descr="image.png"/>
+          <p:cNvPicPr>
+            <a:picLocks noChangeAspect="1"/>
+          </p:cNvPicPr>
+          <p:nvPr/>
+        </p:nvPicPr>
+        <p:blipFill>
+          <a:blip r:embed="rId2"/>
+          <a:stretch>
+            <a:fillRect/>
+          </a:stretch>
+        </p:blipFill>
+        <p:spPr>
+          <a:xfrm>
+            <a:off x="457200" y="896815"/>
+            <a:ext cx="8229600" cy="5064369"/>
+          </a:xfrm>
+          <a:prstGeom prst="rect">
+            <a:avLst/>
+          </a:prstGeom>
+        </p:spPr>
+      </p:pic>
+    </p:spTree>
+  </p:cSld>
+  <p:clrMapOvr>
+    <a:masterClrMapping/>
+  </p:clrMapOvr>
+</p:sld>
+</file>
+
+<file path=ppt/slides/slide35.xml><?xml version="1.0" encoding="utf-8"?>
+<p:sld xmlns:a="http://schemas.openxmlformats.org/drawingml/2006/main" xmlns:p="http://schemas.openxmlformats.org/presentationml/2006/main" xmlns:r="http://schemas.openxmlformats.org/officeDocument/2006/relationships">
+  <p:cSld>
+    <p:spTree>
+      <p:nvGrpSpPr>
+        <p:cNvPr id="1" name=""/>
+        <p:cNvGrpSpPr/>
+        <p:nvPr/>
+      </p:nvGrpSpPr>
+      <p:grpSpPr/>
+      <p:sp>
+        <p:nvSpPr>
+          <p:cNvPr id="2" name="Title 1"/>
+          <p:cNvSpPr>
+            <a:spLocks noGrp="1"/>
+          </p:cNvSpPr>
+          <p:nvPr>
+            <p:ph type="title"/>
+          </p:nvPr>
+        </p:nvSpPr>
+        <p:spPr/>
+        <p:txBody>
+          <a:bodyPr/>
+          <a:lstStyle/>
+          <a:p/>
+        </p:txBody>
+      </p:sp>
+      <p:sp>
+        <p:nvSpPr>
+          <p:cNvPr id="4" name="Text Placeholder 3"/>
+          <p:cNvSpPr>
+            <a:spLocks noGrp="1"/>
+          </p:cNvSpPr>
+          <p:nvPr>
+            <p:ph type="body" idx="2" sz="half"/>
+          </p:nvPr>
+        </p:nvSpPr>
+        <p:spPr/>
+        <p:txBody>
+          <a:bodyPr/>
+          <a:lstStyle/>
+          <a:p/>
+        </p:txBody>
+      </p:sp>
+      <p:pic>
+        <p:nvPicPr>
+          <p:cNvPr id="5" name="Picture 4" descr="image.png"/>
+          <p:cNvPicPr>
+            <a:picLocks noChangeAspect="1"/>
+          </p:cNvPicPr>
+          <p:nvPr/>
+        </p:nvPicPr>
+        <p:blipFill>
+          <a:blip r:embed="rId2"/>
+          <a:stretch>
+            <a:fillRect/>
+          </a:stretch>
+        </p:blipFill>
+        <p:spPr>
+          <a:xfrm>
+            <a:off x="457200" y="685800"/>
+            <a:ext cx="8229600" cy="5486400"/>
+          </a:xfrm>
+          <a:prstGeom prst="rect">
+            <a:avLst/>
+          </a:prstGeom>
+        </p:spPr>
+      </p:pic>
     </p:spTree>
   </p:cSld>
   <p:clrMapOvr>
@@ -5349,6 +5432,40 @@
         <p:nvPr/>
       </p:nvGrpSpPr>
       <p:grpSpPr/>
+      <p:sp>
+        <p:nvSpPr>
+          <p:cNvPr id="2" name="Title 1"/>
+          <p:cNvSpPr>
+            <a:spLocks noGrp="1"/>
+          </p:cNvSpPr>
+          <p:nvPr>
+            <p:ph type="title"/>
+          </p:nvPr>
+        </p:nvSpPr>
+        <p:spPr/>
+        <p:txBody>
+          <a:bodyPr/>
+          <a:lstStyle/>
+          <a:p/>
+        </p:txBody>
+      </p:sp>
+      <p:sp>
+        <p:nvSpPr>
+          <p:cNvPr id="4" name="Text Placeholder 3"/>
+          <p:cNvSpPr>
+            <a:spLocks noGrp="1"/>
+          </p:cNvSpPr>
+          <p:nvPr>
+            <p:ph type="body" idx="2" sz="half"/>
+          </p:nvPr>
+        </p:nvSpPr>
+        <p:spPr/>
+        <p:txBody>
+          <a:bodyPr/>
+          <a:lstStyle/>
+          <a:p/>
+        </p:txBody>
+      </p:sp>
       <p:pic>
         <p:nvPicPr>
           <p:cNvPr id="5" name="Picture 4" descr="image.png"/>
@@ -5365,56 +5482,14 @@
         </p:blipFill>
         <p:spPr>
           <a:xfrm>
-            <a:off x="457200" y="274320"/>
-            <a:ext cx="5486400" cy="4572000"/>
+            <a:off x="1371600" y="228600"/>
+            <a:ext cx="6400800" cy="6400800"/>
           </a:xfrm>
           <a:prstGeom prst="rect">
             <a:avLst/>
           </a:prstGeom>
         </p:spPr>
       </p:pic>
-      <p:sp>
-        <p:nvSpPr>
-          <p:cNvPr id="2" name="Title 1"/>
-          <p:cNvSpPr>
-            <a:spLocks noGrp="1"/>
-          </p:cNvSpPr>
-          <p:nvPr>
-            <p:ph type="title"/>
-          </p:nvPr>
-        </p:nvSpPr>
-        <p:spPr/>
-        <p:txBody>
-          <a:bodyPr/>
-          <a:lstStyle/>
-          <a:p>
-            <a:r>
-              <a:t>Main indicators in Israel</a:t>
-            </a:r>
-          </a:p>
-        </p:txBody>
-      </p:sp>
-      <p:sp>
-        <p:nvSpPr>
-          <p:cNvPr id="4" name="Text Placeholder 3"/>
-          <p:cNvSpPr>
-            <a:spLocks noGrp="1"/>
-          </p:cNvSpPr>
-          <p:nvPr>
-            <p:ph type="body" idx="2" sz="half"/>
-          </p:nvPr>
-        </p:nvSpPr>
-        <p:spPr/>
-        <p:txBody>
-          <a:bodyPr/>
-          <a:lstStyle/>
-          <a:p>
-            <a:r>
-              <a:t>Progression in the last week</a:t>
-            </a:r>
-          </a:p>
-        </p:txBody>
-      </p:sp>
     </p:spTree>
   </p:cSld>
   <p:clrMapOvr>
@@ -5433,6 +5508,40 @@
         <p:nvPr/>
       </p:nvGrpSpPr>
       <p:grpSpPr/>
+      <p:sp>
+        <p:nvSpPr>
+          <p:cNvPr id="2" name="Title 1"/>
+          <p:cNvSpPr>
+            <a:spLocks noGrp="1"/>
+          </p:cNvSpPr>
+          <p:nvPr>
+            <p:ph type="title"/>
+          </p:nvPr>
+        </p:nvSpPr>
+        <p:spPr/>
+        <p:txBody>
+          <a:bodyPr/>
+          <a:lstStyle/>
+          <a:p/>
+        </p:txBody>
+      </p:sp>
+      <p:sp>
+        <p:nvSpPr>
+          <p:cNvPr id="4" name="Text Placeholder 3"/>
+          <p:cNvSpPr>
+            <a:spLocks noGrp="1"/>
+          </p:cNvSpPr>
+          <p:nvPr>
+            <p:ph type="body" idx="2" sz="half"/>
+          </p:nvPr>
+        </p:nvSpPr>
+        <p:spPr/>
+        <p:txBody>
+          <a:bodyPr/>
+          <a:lstStyle/>
+          <a:p/>
+        </p:txBody>
+      </p:sp>
       <p:pic>
         <p:nvPicPr>
           <p:cNvPr id="5" name="Picture 4" descr="image.png"/>
@@ -5449,52 +5558,14 @@
         </p:blipFill>
         <p:spPr>
           <a:xfrm>
-            <a:off x="457200" y="274320"/>
-            <a:ext cx="5486400" cy="4572000"/>
+            <a:off x="1371600" y="228600"/>
+            <a:ext cx="6400800" cy="6400800"/>
           </a:xfrm>
           <a:prstGeom prst="rect">
             <a:avLst/>
           </a:prstGeom>
         </p:spPr>
       </p:pic>
-      <p:sp>
-        <p:nvSpPr>
-          <p:cNvPr id="2" name="Title 1"/>
-          <p:cNvSpPr>
-            <a:spLocks noGrp="1"/>
-          </p:cNvSpPr>
-          <p:nvPr>
-            <p:ph type="title"/>
-          </p:nvPr>
-        </p:nvSpPr>
-        <p:spPr/>
-        <p:txBody>
-          <a:bodyPr/>
-          <a:lstStyle/>
-          <a:p>
-            <a:r>
-              <a:t>Israel on Key Metrics</a:t>
-            </a:r>
-          </a:p>
-        </p:txBody>
-      </p:sp>
-      <p:sp>
-        <p:nvSpPr>
-          <p:cNvPr id="4" name="Text Placeholder 3"/>
-          <p:cNvSpPr>
-            <a:spLocks noGrp="1"/>
-          </p:cNvSpPr>
-          <p:nvPr>
-            <p:ph type="body" idx="2" sz="half"/>
-          </p:nvPr>
-        </p:nvSpPr>
-        <p:spPr/>
-        <p:txBody>
-          <a:bodyPr/>
-          <a:lstStyle/>
-          <a:p/>
-        </p:txBody>
-      </p:sp>
     </p:spTree>
   </p:cSld>
   <p:clrMapOvr>
@@ -5513,6 +5584,40 @@
         <p:nvPr/>
       </p:nvGrpSpPr>
       <p:grpSpPr/>
+      <p:sp>
+        <p:nvSpPr>
+          <p:cNvPr id="2" name="Title 1"/>
+          <p:cNvSpPr>
+            <a:spLocks noGrp="1"/>
+          </p:cNvSpPr>
+          <p:nvPr>
+            <p:ph type="title"/>
+          </p:nvPr>
+        </p:nvSpPr>
+        <p:spPr/>
+        <p:txBody>
+          <a:bodyPr/>
+          <a:lstStyle/>
+          <a:p/>
+        </p:txBody>
+      </p:sp>
+      <p:sp>
+        <p:nvSpPr>
+          <p:cNvPr id="4" name="Text Placeholder 3"/>
+          <p:cNvSpPr>
+            <a:spLocks noGrp="1"/>
+          </p:cNvSpPr>
+          <p:nvPr>
+            <p:ph type="body" idx="2" sz="half"/>
+          </p:nvPr>
+        </p:nvSpPr>
+        <p:spPr/>
+        <p:txBody>
+          <a:bodyPr/>
+          <a:lstStyle/>
+          <a:p/>
+        </p:txBody>
+      </p:sp>
       <p:pic>
         <p:nvPicPr>
           <p:cNvPr id="5" name="Picture 4" descr="image.png"/>
@@ -5529,52 +5634,14 @@
         </p:blipFill>
         <p:spPr>
           <a:xfrm>
-            <a:off x="457200" y="274320"/>
-            <a:ext cx="5486400" cy="4572000"/>
+            <a:off x="1371600" y="228600"/>
+            <a:ext cx="6400800" cy="6400800"/>
           </a:xfrm>
           <a:prstGeom prst="rect">
             <a:avLst/>
           </a:prstGeom>
         </p:spPr>
       </p:pic>
-      <p:sp>
-        <p:nvSpPr>
-          <p:cNvPr id="2" name="Title 1"/>
-          <p:cNvSpPr>
-            <a:spLocks noGrp="1"/>
-          </p:cNvSpPr>
-          <p:nvPr>
-            <p:ph type="title"/>
-          </p:nvPr>
-        </p:nvSpPr>
-        <p:spPr/>
-        <p:txBody>
-          <a:bodyPr/>
-          <a:lstStyle/>
-          <a:p>
-            <a:r>
-              <a:t>Changes in Israel's Rankings from Last Week</a:t>
-            </a:r>
-          </a:p>
-        </p:txBody>
-      </p:sp>
-      <p:sp>
-        <p:nvSpPr>
-          <p:cNvPr id="4" name="Text Placeholder 3"/>
-          <p:cNvSpPr>
-            <a:spLocks noGrp="1"/>
-          </p:cNvSpPr>
-          <p:nvPr>
-            <p:ph type="body" idx="2" sz="half"/>
-          </p:nvPr>
-        </p:nvSpPr>
-        <p:spPr/>
-        <p:txBody>
-          <a:bodyPr/>
-          <a:lstStyle/>
-          <a:p/>
-        </p:txBody>
-      </p:sp>
     </p:spTree>
   </p:cSld>
   <p:clrMapOvr>
@@ -5593,6 +5660,40 @@
         <p:nvPr/>
       </p:nvGrpSpPr>
       <p:grpSpPr/>
+      <p:sp>
+        <p:nvSpPr>
+          <p:cNvPr id="2" name="Title 1"/>
+          <p:cNvSpPr>
+            <a:spLocks noGrp="1"/>
+          </p:cNvSpPr>
+          <p:nvPr>
+            <p:ph type="title"/>
+          </p:nvPr>
+        </p:nvSpPr>
+        <p:spPr/>
+        <p:txBody>
+          <a:bodyPr/>
+          <a:lstStyle/>
+          <a:p/>
+        </p:txBody>
+      </p:sp>
+      <p:sp>
+        <p:nvSpPr>
+          <p:cNvPr id="4" name="Text Placeholder 3"/>
+          <p:cNvSpPr>
+            <a:spLocks noGrp="1"/>
+          </p:cNvSpPr>
+          <p:nvPr>
+            <p:ph type="body" idx="2" sz="half"/>
+          </p:nvPr>
+        </p:nvSpPr>
+        <p:spPr/>
+        <p:txBody>
+          <a:bodyPr/>
+          <a:lstStyle/>
+          <a:p/>
+        </p:txBody>
+      </p:sp>
       <p:pic>
         <p:nvPicPr>
           <p:cNvPr id="5" name="Picture 4" descr="image.png"/>
@@ -5609,52 +5710,14 @@
         </p:blipFill>
         <p:spPr>
           <a:xfrm>
-            <a:off x="457200" y="274320"/>
-            <a:ext cx="6858000" cy="4572000"/>
+            <a:off x="457200" y="685800"/>
+            <a:ext cx="8229600" cy="5486400"/>
           </a:xfrm>
           <a:prstGeom prst="rect">
             <a:avLst/>
           </a:prstGeom>
         </p:spPr>
       </p:pic>
-      <p:sp>
-        <p:nvSpPr>
-          <p:cNvPr id="2" name="Title 1"/>
-          <p:cNvSpPr>
-            <a:spLocks noGrp="1"/>
-          </p:cNvSpPr>
-          <p:nvPr>
-            <p:ph type="title"/>
-          </p:nvPr>
-        </p:nvSpPr>
-        <p:spPr/>
-        <p:txBody>
-          <a:bodyPr/>
-          <a:lstStyle/>
-          <a:p>
-            <a:r>
-              <a:t>COVID-19 confirmed cases vs COVID-19 fatalities, logarithmic scale</a:t>
-            </a:r>
-          </a:p>
-        </p:txBody>
-      </p:sp>
-      <p:sp>
-        <p:nvSpPr>
-          <p:cNvPr id="4" name="Text Placeholder 3"/>
-          <p:cNvSpPr>
-            <a:spLocks noGrp="1"/>
-          </p:cNvSpPr>
-          <p:nvPr>
-            <p:ph type="body" idx="2" sz="half"/>
-          </p:nvPr>
-        </p:nvSpPr>
-        <p:spPr/>
-        <p:txBody>
-          <a:bodyPr/>
-          <a:lstStyle/>
-          <a:p/>
-        </p:txBody>
-      </p:sp>
     </p:spTree>
   </p:cSld>
   <p:clrMapOvr>
@@ -5673,6 +5736,40 @@
         <p:nvPr/>
       </p:nvGrpSpPr>
       <p:grpSpPr/>
+      <p:sp>
+        <p:nvSpPr>
+          <p:cNvPr id="2" name="Title 1"/>
+          <p:cNvSpPr>
+            <a:spLocks noGrp="1"/>
+          </p:cNvSpPr>
+          <p:nvPr>
+            <p:ph type="title"/>
+          </p:nvPr>
+        </p:nvSpPr>
+        <p:spPr/>
+        <p:txBody>
+          <a:bodyPr/>
+          <a:lstStyle/>
+          <a:p/>
+        </p:txBody>
+      </p:sp>
+      <p:sp>
+        <p:nvSpPr>
+          <p:cNvPr id="4" name="Text Placeholder 3"/>
+          <p:cNvSpPr>
+            <a:spLocks noGrp="1"/>
+          </p:cNvSpPr>
+          <p:nvPr>
+            <p:ph type="body" idx="2" sz="half"/>
+          </p:nvPr>
+        </p:nvSpPr>
+        <p:spPr/>
+        <p:txBody>
+          <a:bodyPr/>
+          <a:lstStyle/>
+          <a:p/>
+        </p:txBody>
+      </p:sp>
       <p:pic>
         <p:nvPicPr>
           <p:cNvPr id="5" name="Picture 4" descr="image.png"/>
@@ -5689,7 +5786,7 @@
         </p:blipFill>
         <p:spPr>
           <a:xfrm>
-            <a:off x="457200" y="274320"/>
+            <a:off x="457200" y="1600200"/>
             <a:ext cx="8229600" cy="3657600"/>
           </a:xfrm>
           <a:prstGeom prst="rect">
@@ -5697,44 +5794,6 @@
           </a:prstGeom>
         </p:spPr>
       </p:pic>
-      <p:sp>
-        <p:nvSpPr>
-          <p:cNvPr id="2" name="Title 1"/>
-          <p:cNvSpPr>
-            <a:spLocks noGrp="1"/>
-          </p:cNvSpPr>
-          <p:nvPr>
-            <p:ph type="title"/>
-          </p:nvPr>
-        </p:nvSpPr>
-        <p:spPr/>
-        <p:txBody>
-          <a:bodyPr/>
-          <a:lstStyle/>
-          <a:p>
-            <a:r>
-              <a:t>Top 20 Countries by COVID-19 Cases</a:t>
-            </a:r>
-          </a:p>
-        </p:txBody>
-      </p:sp>
-      <p:sp>
-        <p:nvSpPr>
-          <p:cNvPr id="4" name="Text Placeholder 3"/>
-          <p:cNvSpPr>
-            <a:spLocks noGrp="1"/>
-          </p:cNvSpPr>
-          <p:nvPr>
-            <p:ph type="body" idx="2" sz="half"/>
-          </p:nvPr>
-        </p:nvSpPr>
-        <p:spPr/>
-        <p:txBody>
-          <a:bodyPr/>
-          <a:lstStyle/>
-          <a:p/>
-        </p:txBody>
-      </p:sp>
     </p:spTree>
   </p:cSld>
   <p:clrMapOvr>
@@ -5753,6 +5812,40 @@
         <p:nvPr/>
       </p:nvGrpSpPr>
       <p:grpSpPr/>
+      <p:sp>
+        <p:nvSpPr>
+          <p:cNvPr id="2" name="Title 1"/>
+          <p:cNvSpPr>
+            <a:spLocks noGrp="1"/>
+          </p:cNvSpPr>
+          <p:nvPr>
+            <p:ph type="title"/>
+          </p:nvPr>
+        </p:nvSpPr>
+        <p:spPr/>
+        <p:txBody>
+          <a:bodyPr/>
+          <a:lstStyle/>
+          <a:p/>
+        </p:txBody>
+      </p:sp>
+      <p:sp>
+        <p:nvSpPr>
+          <p:cNvPr id="4" name="Text Placeholder 3"/>
+          <p:cNvSpPr>
+            <a:spLocks noGrp="1"/>
+          </p:cNvSpPr>
+          <p:nvPr>
+            <p:ph type="body" idx="2" sz="half"/>
+          </p:nvPr>
+        </p:nvSpPr>
+        <p:spPr/>
+        <p:txBody>
+          <a:bodyPr/>
+          <a:lstStyle/>
+          <a:p/>
+        </p:txBody>
+      </p:sp>
       <p:pic>
         <p:nvPicPr>
           <p:cNvPr id="5" name="Picture 4" descr="image.png"/>
@@ -5769,7 +5862,7 @@
         </p:blipFill>
         <p:spPr>
           <a:xfrm>
-            <a:off x="457200" y="274320"/>
+            <a:off x="457200" y="1600200"/>
             <a:ext cx="8229600" cy="3657600"/>
           </a:xfrm>
           <a:prstGeom prst="rect">
@@ -5777,44 +5870,6 @@
           </a:prstGeom>
         </p:spPr>
       </p:pic>
-      <p:sp>
-        <p:nvSpPr>
-          <p:cNvPr id="2" name="Title 1"/>
-          <p:cNvSpPr>
-            <a:spLocks noGrp="1"/>
-          </p:cNvSpPr>
-          <p:nvPr>
-            <p:ph type="title"/>
-          </p:nvPr>
-        </p:nvSpPr>
-        <p:spPr/>
-        <p:txBody>
-          <a:bodyPr/>
-          <a:lstStyle/>
-          <a:p>
-            <a:r>
-              <a:t>Top 20 Countries by Fatal COVID-19 Cases</a:t>
-            </a:r>
-          </a:p>
-        </p:txBody>
-      </p:sp>
-      <p:sp>
-        <p:nvSpPr>
-          <p:cNvPr id="4" name="Text Placeholder 3"/>
-          <p:cNvSpPr>
-            <a:spLocks noGrp="1"/>
-          </p:cNvSpPr>
-          <p:nvPr>
-            <p:ph type="body" idx="2" sz="half"/>
-          </p:nvPr>
-        </p:nvSpPr>
-        <p:spPr/>
-        <p:txBody>
-          <a:bodyPr/>
-          <a:lstStyle/>
-          <a:p/>
-        </p:txBody>
-      </p:sp>
     </p:spTree>
   </p:cSld>
   <p:clrMapOvr>

</xml_diff>